<commit_message>
Anomalische User - CSV-Export
</commit_message>
<xml_diff>
--- a/docs/ReleaseV0_2_0.pptx
+++ b/docs/ReleaseV0_2_0.pptx
@@ -5,20 +5,21 @@
     <p:sldMasterId id="2147483660" r:id="rId1"/>
   </p:sldMasterIdLst>
   <p:notesMasterIdLst>
-    <p:notesMasterId r:id="rId10"/>
+    <p:notesMasterId r:id="rId11"/>
   </p:notesMasterIdLst>
   <p:handoutMasterIdLst>
-    <p:handoutMasterId r:id="rId11"/>
+    <p:handoutMasterId r:id="rId12"/>
   </p:handoutMasterIdLst>
   <p:sldIdLst>
     <p:sldId id="257" r:id="rId2"/>
     <p:sldId id="258" r:id="rId3"/>
     <p:sldId id="276" r:id="rId4"/>
-    <p:sldId id="277" r:id="rId5"/>
-    <p:sldId id="280" r:id="rId6"/>
-    <p:sldId id="279" r:id="rId7"/>
-    <p:sldId id="281" r:id="rId8"/>
-    <p:sldId id="275" r:id="rId9"/>
+    <p:sldId id="282" r:id="rId5"/>
+    <p:sldId id="277" r:id="rId6"/>
+    <p:sldId id="280" r:id="rId7"/>
+    <p:sldId id="279" r:id="rId8"/>
+    <p:sldId id="281" r:id="rId9"/>
+    <p:sldId id="275" r:id="rId10"/>
   </p:sldIdLst>
   <p:sldSz cx="12192000" cy="6858000"/>
   <p:notesSz cx="7102475" cy="10234613"/>
@@ -131,7 +132,7 @@
 <file path=ppt/revisionInfo.xml><?xml version="1.0" encoding="utf-8"?>
 <p1510:revInfo xmlns:a="http://schemas.openxmlformats.org/drawingml/2006/main" xmlns:r="http://schemas.openxmlformats.org/officeDocument/2006/relationships" xmlns:p1510="http://schemas.microsoft.com/office/powerpoint/2015/10/main">
   <p1510:revLst>
-    <p1510:client id="{4822EA44-455D-48ED-8237-F2F69C20D063}" v="14" dt="2025-04-30T21:36:28.770"/>
+    <p1510:client id="{4822EA44-455D-48ED-8237-F2F69C20D063}" v="15" dt="2025-05-02T11:00:14.300"/>
   </p1510:revLst>
 </p1510:revInfo>
 </file>
@@ -140,8 +141,8 @@
 <pc:chgInfo xmlns:a="http://schemas.openxmlformats.org/drawingml/2006/main" xmlns:r="http://schemas.openxmlformats.org/officeDocument/2006/relationships" xmlns:ac="http://schemas.microsoft.com/office/drawing/2013/main/command" xmlns:pc="http://schemas.microsoft.com/office/powerpoint/2013/main/command">
   <pc:docChgLst>
     <pc:chgData name="Ljutic Kerim" userId="3399f650-dab7-4c51-bc22-3354e7c5d919" providerId="ADAL" clId="{4822EA44-455D-48ED-8237-F2F69C20D063}"/>
-    <pc:docChg chg="undo redo custSel modSld">
-      <pc:chgData name="Ljutic Kerim" userId="3399f650-dab7-4c51-bc22-3354e7c5d919" providerId="ADAL" clId="{4822EA44-455D-48ED-8237-F2F69C20D063}" dt="2025-05-01T08:02:56.595" v="757" actId="20577"/>
+    <pc:docChg chg="undo redo custSel addSld modSld sldOrd">
+      <pc:chgData name="Ljutic Kerim" userId="3399f650-dab7-4c51-bc22-3354e7c5d919" providerId="ADAL" clId="{4822EA44-455D-48ED-8237-F2F69C20D063}" dt="2025-05-02T11:19:47.563" v="1018" actId="20577"/>
       <pc:docMkLst>
         <pc:docMk/>
       </pc:docMkLst>
@@ -172,14 +173,6 @@
             <pc:docMk/>
             <pc:sldMk cId="3118426244" sldId="258"/>
             <ac:spMk id="3" creationId="{C5B1AAFB-AC8F-B456-360A-188C93E94502}"/>
-          </ac:spMkLst>
-        </pc:spChg>
-        <pc:spChg chg="del">
-          <ac:chgData name="Ljutic Kerim" userId="3399f650-dab7-4c51-bc22-3354e7c5d919" providerId="ADAL" clId="{4822EA44-455D-48ED-8237-F2F69C20D063}" dt="2025-04-30T21:15:56.598" v="0" actId="478"/>
-          <ac:spMkLst>
-            <pc:docMk/>
-            <pc:sldMk cId="3118426244" sldId="258"/>
-            <ac:spMk id="10" creationId="{487CB666-D122-6C9A-D89E-5E5BC6B53DA7}"/>
           </ac:spMkLst>
         </pc:spChg>
       </pc:sldChg>
@@ -227,38 +220,6 @@
             <ac:spMk id="3" creationId="{7C10AD83-9F3D-AA34-7303-A25C6E2BD70B}"/>
           </ac:spMkLst>
         </pc:spChg>
-        <pc:spChg chg="add">
-          <ac:chgData name="Ljutic Kerim" userId="3399f650-dab7-4c51-bc22-3354e7c5d919" providerId="ADAL" clId="{4822EA44-455D-48ED-8237-F2F69C20D063}" dt="2025-04-30T21:31:45.911" v="297"/>
-          <ac:spMkLst>
-            <pc:docMk/>
-            <pc:sldMk cId="1714832941" sldId="279"/>
-            <ac:spMk id="4" creationId="{39DCF4B4-25EC-2217-70A7-E419185C42FB}"/>
-          </ac:spMkLst>
-        </pc:spChg>
-        <pc:spChg chg="add">
-          <ac:chgData name="Ljutic Kerim" userId="3399f650-dab7-4c51-bc22-3354e7c5d919" providerId="ADAL" clId="{4822EA44-455D-48ED-8237-F2F69C20D063}" dt="2025-04-30T21:33:35.755" v="320"/>
-          <ac:spMkLst>
-            <pc:docMk/>
-            <pc:sldMk cId="1714832941" sldId="279"/>
-            <ac:spMk id="5" creationId="{A539203E-6D89-96FF-A9CA-FBB22ACCDCE7}"/>
-          </ac:spMkLst>
-        </pc:spChg>
-        <pc:spChg chg="add">
-          <ac:chgData name="Ljutic Kerim" userId="3399f650-dab7-4c51-bc22-3354e7c5d919" providerId="ADAL" clId="{4822EA44-455D-48ED-8237-F2F69C20D063}" dt="2025-04-30T21:36:03.201" v="354"/>
-          <ac:spMkLst>
-            <pc:docMk/>
-            <pc:sldMk cId="1714832941" sldId="279"/>
-            <ac:spMk id="6" creationId="{EBF42772-3FE9-BA5D-54B1-7521AAE2BAC3}"/>
-          </ac:spMkLst>
-        </pc:spChg>
-        <pc:spChg chg="add">
-          <ac:chgData name="Ljutic Kerim" userId="3399f650-dab7-4c51-bc22-3354e7c5d919" providerId="ADAL" clId="{4822EA44-455D-48ED-8237-F2F69C20D063}" dt="2025-04-30T21:36:25.616" v="360"/>
-          <ac:spMkLst>
-            <pc:docMk/>
-            <pc:sldMk cId="1714832941" sldId="279"/>
-            <ac:spMk id="7" creationId="{521F602E-2995-0144-9CDA-8E322C1F8666}"/>
-          </ac:spMkLst>
-        </pc:spChg>
       </pc:sldChg>
       <pc:sldChg chg="addSp delSp modSp mod">
         <pc:chgData name="Ljutic Kerim" userId="3399f650-dab7-4c51-bc22-3354e7c5d919" providerId="ADAL" clId="{4822EA44-455D-48ED-8237-F2F69C20D063}" dt="2025-04-30T21:37:59.559" v="548" actId="20577"/>
@@ -290,14 +251,6 @@
             <ac:picMk id="3" creationId="{03FC4C3E-2D4C-16F5-674D-B5257A8FC930}"/>
           </ac:picMkLst>
         </pc:picChg>
-        <pc:picChg chg="del mod">
-          <ac:chgData name="Ljutic Kerim" userId="3399f650-dab7-4c51-bc22-3354e7c5d919" providerId="ADAL" clId="{4822EA44-455D-48ED-8237-F2F69C20D063}" dt="2025-04-30T21:30:21.807" v="288" actId="478"/>
-          <ac:picMkLst>
-            <pc:docMk/>
-            <pc:sldMk cId="95467598" sldId="280"/>
-            <ac:picMk id="8" creationId="{90960E15-0CC0-FAB5-FDC4-17A02595BA81}"/>
-          </ac:picMkLst>
-        </pc:picChg>
       </pc:sldChg>
       <pc:sldChg chg="modSp mod">
         <pc:chgData name="Ljutic Kerim" userId="3399f650-dab7-4c51-bc22-3354e7c5d919" providerId="ADAL" clId="{4822EA44-455D-48ED-8237-F2F69C20D063}" dt="2025-04-30T21:38:36.886" v="561" actId="20577"/>
@@ -311,6 +264,45 @@
             <pc:docMk/>
             <pc:sldMk cId="1992031586" sldId="281"/>
             <ac:spMk id="3" creationId="{829ABF8D-3659-6947-BD29-77E73F8646C6}"/>
+          </ac:spMkLst>
+        </pc:spChg>
+      </pc:sldChg>
+      <pc:sldChg chg="addSp modSp add mod ord">
+        <pc:chgData name="Ljutic Kerim" userId="3399f650-dab7-4c51-bc22-3354e7c5d919" providerId="ADAL" clId="{4822EA44-455D-48ED-8237-F2F69C20D063}" dt="2025-05-02T11:19:47.563" v="1018" actId="20577"/>
+        <pc:sldMkLst>
+          <pc:docMk/>
+          <pc:sldMk cId="2810979960" sldId="282"/>
+        </pc:sldMkLst>
+        <pc:spChg chg="mod">
+          <ac:chgData name="Ljutic Kerim" userId="3399f650-dab7-4c51-bc22-3354e7c5d919" providerId="ADAL" clId="{4822EA44-455D-48ED-8237-F2F69C20D063}" dt="2025-05-02T10:59:56.504" v="774" actId="20577"/>
+          <ac:spMkLst>
+            <pc:docMk/>
+            <pc:sldMk cId="2810979960" sldId="282"/>
+            <ac:spMk id="2" creationId="{4E6CEB6D-ECDE-FAD4-989F-C6CA9B4AB3DB}"/>
+          </ac:spMkLst>
+        </pc:spChg>
+        <pc:spChg chg="mod">
+          <ac:chgData name="Ljutic Kerim" userId="3399f650-dab7-4c51-bc22-3354e7c5d919" providerId="ADAL" clId="{4822EA44-455D-48ED-8237-F2F69C20D063}" dt="2025-05-02T11:02:59.570" v="874" actId="20577"/>
+          <ac:spMkLst>
+            <pc:docMk/>
+            <pc:sldMk cId="2810979960" sldId="282"/>
+            <ac:spMk id="3" creationId="{E637D996-D22C-2C3E-56E7-C857F0CC41E1}"/>
+          </ac:spMkLst>
+        </pc:spChg>
+        <pc:spChg chg="add mod">
+          <ac:chgData name="Ljutic Kerim" userId="3399f650-dab7-4c51-bc22-3354e7c5d919" providerId="ADAL" clId="{4822EA44-455D-48ED-8237-F2F69C20D063}" dt="2025-05-02T11:03:12.323" v="887" actId="20577"/>
+          <ac:spMkLst>
+            <pc:docMk/>
+            <pc:sldMk cId="2810979960" sldId="282"/>
+            <ac:spMk id="4" creationId="{5C4E4604-3E81-79E6-0E48-636C053A7BB7}"/>
+          </ac:spMkLst>
+        </pc:spChg>
+        <pc:spChg chg="add mod">
+          <ac:chgData name="Ljutic Kerim" userId="3399f650-dab7-4c51-bc22-3354e7c5d919" providerId="ADAL" clId="{4822EA44-455D-48ED-8237-F2F69C20D063}" dt="2025-05-02T11:19:47.563" v="1018" actId="20577"/>
+          <ac:spMkLst>
+            <pc:docMk/>
+            <pc:sldMk cId="2810979960" sldId="282"/>
+            <ac:spMk id="5" creationId="{D8D18AC5-6EF8-A78B-7FB7-E6DCF42320A7}"/>
           </ac:spMkLst>
         </pc:spChg>
       </pc:sldChg>
@@ -401,7 +393,7 @@
           <a:p>
             <a:fld id="{05E02316-A3A9-40CE-8399-988D8D269502}" type="datetimeFigureOut">
               <a:rPr lang="de-AT" smtClean="0"/>
-              <a:t>01.05.2025</a:t>
+              <a:t>02.05.2025</a:t>
             </a:fld>
             <a:endParaRPr lang="de-AT"/>
           </a:p>
@@ -566,7 +558,7 @@
           <a:p>
             <a:fld id="{F5E89DEF-C035-41A2-9AFE-A6026D4C04BE}" type="datetimeFigureOut">
               <a:rPr lang="de-AT" smtClean="0"/>
-              <a:t>01.05.2025</a:t>
+              <a:t>02.05.2025</a:t>
             </a:fld>
             <a:endParaRPr lang="de-AT"/>
           </a:p>
@@ -10171,6 +10163,461 @@
         <p:cNvPr id="1" name="">
           <a:extLst>
             <a:ext uri="{FF2B5EF4-FFF2-40B4-BE49-F238E27FC236}">
+              <a16:creationId xmlns:a16="http://schemas.microsoft.com/office/drawing/2014/main" id="{125C3294-D3EC-28C0-AF17-B8C0ECB2469D}"/>
+            </a:ext>
+          </a:extLst>
+        </p:cNvPr>
+        <p:cNvGrpSpPr/>
+        <p:nvPr/>
+      </p:nvGrpSpPr>
+      <p:grpSpPr>
+        <a:xfrm>
+          <a:off x="0" y="0"/>
+          <a:ext cx="0" cy="0"/>
+          <a:chOff x="0" y="0"/>
+          <a:chExt cx="0" cy="0"/>
+        </a:xfrm>
+      </p:grpSpPr>
+      <p:sp>
+        <p:nvSpPr>
+          <p:cNvPr id="2" name="Titel 1">
+            <a:extLst>
+              <a:ext uri="{FF2B5EF4-FFF2-40B4-BE49-F238E27FC236}">
+                <a16:creationId xmlns:a16="http://schemas.microsoft.com/office/drawing/2014/main" id="{4E6CEB6D-ECDE-FAD4-989F-C6CA9B4AB3DB}"/>
+              </a:ext>
+            </a:extLst>
+          </p:cNvPr>
+          <p:cNvSpPr>
+            <a:spLocks noGrp="1"/>
+          </p:cNvSpPr>
+          <p:nvPr>
+            <p:ph type="title"/>
+          </p:nvPr>
+        </p:nvSpPr>
+        <p:spPr/>
+        <p:txBody>
+          <a:bodyPr/>
+          <a:lstStyle/>
+          <a:p>
+            <a:r>
+              <a:rPr lang="en-US" noProof="0" dirty="0" err="1"/>
+              <a:t>Einsatz</a:t>
+            </a:r>
+            <a:r>
+              <a:rPr lang="en-US" noProof="0" dirty="0"/>
+              <a:t> von KI</a:t>
+            </a:r>
+          </a:p>
+        </p:txBody>
+      </p:sp>
+      <p:sp>
+        <p:nvSpPr>
+          <p:cNvPr id="3" name="Inhaltsplatzhalter 2">
+            <a:extLst>
+              <a:ext uri="{FF2B5EF4-FFF2-40B4-BE49-F238E27FC236}">
+                <a16:creationId xmlns:a16="http://schemas.microsoft.com/office/drawing/2014/main" id="{E637D996-D22C-2C3E-56E7-C857F0CC41E1}"/>
+              </a:ext>
+            </a:extLst>
+          </p:cNvPr>
+          <p:cNvSpPr>
+            <a:spLocks noGrp="1"/>
+          </p:cNvSpPr>
+          <p:nvPr>
+            <p:ph idx="1"/>
+          </p:nvPr>
+        </p:nvSpPr>
+        <p:spPr>
+          <a:xfrm>
+            <a:off x="471542" y="1051561"/>
+            <a:ext cx="11139784" cy="2377440"/>
+          </a:xfrm>
+        </p:spPr>
+        <p:txBody>
+          <a:bodyPr>
+            <a:normAutofit/>
+          </a:bodyPr>
+          <a:lstStyle/>
+          <a:p>
+            <a:pPr marL="216000" lvl="1">
+              <a:spcBef>
+                <a:spcPts val="800"/>
+              </a:spcBef>
+              <a:buSzPct val="120000"/>
+              <a:buFont typeface="Arial" panose="020B0604020202020204" pitchFamily="34" charset="0"/>
+              <a:buChar char="•"/>
+            </a:pPr>
+            <a:r>
+              <a:rPr lang="en-US" b="1" dirty="0" err="1"/>
+              <a:t>Richtige</a:t>
+            </a:r>
+            <a:r>
+              <a:rPr lang="en-US" b="1" dirty="0"/>
+              <a:t> Tesseract-Version </a:t>
+            </a:r>
+            <a:r>
+              <a:rPr lang="en-US" b="1" dirty="0" err="1"/>
+              <a:t>finden</a:t>
+            </a:r>
+            <a:endParaRPr lang="en-US" b="1" dirty="0"/>
+          </a:p>
+          <a:p>
+            <a:pPr marL="216000" lvl="1">
+              <a:spcBef>
+                <a:spcPts val="800"/>
+              </a:spcBef>
+              <a:buSzPct val="120000"/>
+              <a:buFont typeface="Arial" panose="020B0604020202020204" pitchFamily="34" charset="0"/>
+              <a:buChar char="•"/>
+            </a:pPr>
+            <a:r>
+              <a:rPr lang="en-US" b="1" dirty="0"/>
+              <a:t>Fehler </a:t>
+            </a:r>
+            <a:r>
+              <a:rPr lang="en-US" b="1" dirty="0" err="1"/>
+              <a:t>zur</a:t>
+            </a:r>
+            <a:r>
+              <a:rPr lang="en-US" b="1" dirty="0"/>
+              <a:t> </a:t>
+            </a:r>
+            <a:r>
+              <a:rPr lang="en-US" b="1" dirty="0" err="1"/>
+              <a:t>Lauffähigkeit</a:t>
+            </a:r>
+            <a:r>
+              <a:rPr lang="en-US" b="1" dirty="0"/>
+              <a:t> </a:t>
+            </a:r>
+            <a:r>
+              <a:rPr lang="en-US" b="1" dirty="0" err="1"/>
+              <a:t>außerhalb</a:t>
+            </a:r>
+            <a:r>
+              <a:rPr lang="en-US" b="1" dirty="0"/>
+              <a:t> der IDE </a:t>
+            </a:r>
+            <a:r>
+              <a:rPr lang="en-US" b="1" dirty="0" err="1"/>
+              <a:t>ausbessern</a:t>
+            </a:r>
+            <a:endParaRPr lang="de-AT" b="1" dirty="0"/>
+          </a:p>
+          <a:p>
+            <a:endParaRPr lang="de-AT" b="1" dirty="0"/>
+          </a:p>
+          <a:p>
+            <a:pPr lvl="1"/>
+            <a:endParaRPr lang="de-AT" b="1" noProof="0" dirty="0"/>
+          </a:p>
+        </p:txBody>
+      </p:sp>
+      <p:sp>
+        <p:nvSpPr>
+          <p:cNvPr id="4" name="Titel 1">
+            <a:extLst>
+              <a:ext uri="{FF2B5EF4-FFF2-40B4-BE49-F238E27FC236}">
+                <a16:creationId xmlns:a16="http://schemas.microsoft.com/office/drawing/2014/main" id="{5C4E4604-3E81-79E6-0E48-636C053A7BB7}"/>
+              </a:ext>
+            </a:extLst>
+          </p:cNvPr>
+          <p:cNvSpPr txBox="1">
+            <a:spLocks/>
+          </p:cNvSpPr>
+          <p:nvPr/>
+        </p:nvSpPr>
+        <p:spPr>
+          <a:xfrm>
+            <a:off x="471542" y="3339434"/>
+            <a:ext cx="11124204" cy="989814"/>
+          </a:xfrm>
+          <a:prstGeom prst="rect">
+            <a:avLst/>
+          </a:prstGeom>
+        </p:spPr>
+        <p:txBody>
+          <a:bodyPr vert="horz" lIns="91440" tIns="45720" rIns="91440" bIns="45720" rtlCol="0" anchor="t">
+            <a:noAutofit/>
+          </a:bodyPr>
+          <a:lstStyle>
+            <a:lvl1pPr algn="l" defTabSz="914400" rtl="0" eaLnBrk="1" latinLnBrk="0" hangingPunct="1">
+              <a:lnSpc>
+                <a:spcPct val="83000"/>
+              </a:lnSpc>
+              <a:spcBef>
+                <a:spcPct val="0"/>
+              </a:spcBef>
+              <a:buNone/>
+              <a:defRPr sz="3000" kern="1200" cap="none" baseline="0">
+                <a:solidFill>
+                  <a:schemeClr val="tx1"/>
+                </a:solidFill>
+                <a:latin typeface="+mj-lt"/>
+                <a:ea typeface="+mj-ea"/>
+                <a:cs typeface="+mj-cs"/>
+              </a:defRPr>
+            </a:lvl1pPr>
+          </a:lstStyle>
+          <a:p>
+            <a:r>
+              <a:rPr lang="en-US" dirty="0" err="1"/>
+              <a:t>Testabdeckung</a:t>
+            </a:r>
+            <a:endParaRPr lang="en-US" dirty="0"/>
+          </a:p>
+        </p:txBody>
+      </p:sp>
+      <p:sp>
+        <p:nvSpPr>
+          <p:cNvPr id="5" name="Inhaltsplatzhalter 2">
+            <a:extLst>
+              <a:ext uri="{FF2B5EF4-FFF2-40B4-BE49-F238E27FC236}">
+                <a16:creationId xmlns:a16="http://schemas.microsoft.com/office/drawing/2014/main" id="{D8D18AC5-6EF8-A78B-7FB7-E6DCF42320A7}"/>
+              </a:ext>
+            </a:extLst>
+          </p:cNvPr>
+          <p:cNvSpPr txBox="1">
+            <a:spLocks/>
+          </p:cNvSpPr>
+          <p:nvPr/>
+        </p:nvSpPr>
+        <p:spPr>
+          <a:xfrm>
+            <a:off x="455962" y="3815964"/>
+            <a:ext cx="11139784" cy="2377440"/>
+          </a:xfrm>
+          <a:prstGeom prst="rect">
+            <a:avLst/>
+          </a:prstGeom>
+        </p:spPr>
+        <p:txBody>
+          <a:bodyPr vert="horz" lIns="91440" tIns="45720" rIns="91440" bIns="45720" rtlCol="0">
+            <a:normAutofit/>
+          </a:bodyPr>
+          <a:lstStyle>
+            <a:lvl1pPr marL="216000" indent="-216000" algn="l" defTabSz="914400" rtl="0" eaLnBrk="1" latinLnBrk="0" hangingPunct="1">
+              <a:lnSpc>
+                <a:spcPct val="105000"/>
+              </a:lnSpc>
+              <a:spcBef>
+                <a:spcPts val="800"/>
+              </a:spcBef>
+              <a:buSzPct val="120000"/>
+              <a:buFont typeface="Arial" panose="020B0604020202020204" pitchFamily="34" charset="0"/>
+              <a:buChar char="•"/>
+              <a:defRPr sz="2000" kern="1200">
+                <a:solidFill>
+                  <a:schemeClr val="tx1"/>
+                </a:solidFill>
+                <a:latin typeface="+mn-lt"/>
+                <a:ea typeface="+mn-ea"/>
+                <a:cs typeface="+mn-cs"/>
+              </a:defRPr>
+            </a:lvl1pPr>
+            <a:lvl2pPr marL="432000" indent="-216000" algn="l" defTabSz="914400" rtl="0" eaLnBrk="1" latinLnBrk="0" hangingPunct="1">
+              <a:lnSpc>
+                <a:spcPct val="105000"/>
+              </a:lnSpc>
+              <a:spcBef>
+                <a:spcPts val="0"/>
+              </a:spcBef>
+              <a:buSzPct val="125000"/>
+              <a:buFont typeface="Arial" panose="020B0604020202020204" pitchFamily="34" charset="0"/>
+              <a:buChar char="◦"/>
+              <a:defRPr sz="2000" kern="1200">
+                <a:solidFill>
+                  <a:schemeClr val="tx1"/>
+                </a:solidFill>
+                <a:latin typeface="+mn-lt"/>
+                <a:ea typeface="+mn-ea"/>
+                <a:cs typeface="+mn-cs"/>
+              </a:defRPr>
+            </a:lvl2pPr>
+            <a:lvl3pPr marL="648000" indent="-216000" algn="l" defTabSz="914400" rtl="0" eaLnBrk="1" latinLnBrk="0" hangingPunct="1">
+              <a:lnSpc>
+                <a:spcPct val="105000"/>
+              </a:lnSpc>
+              <a:spcBef>
+                <a:spcPts val="0"/>
+              </a:spcBef>
+              <a:buSzPct val="85000"/>
+              <a:buFont typeface="Wingdings" panose="05000000000000000000" pitchFamily="2" charset="2"/>
+              <a:buChar char=""/>
+              <a:defRPr sz="1800" kern="1200">
+                <a:solidFill>
+                  <a:schemeClr val="tx1"/>
+                </a:solidFill>
+                <a:latin typeface="+mn-lt"/>
+                <a:ea typeface="+mn-ea"/>
+                <a:cs typeface="+mn-cs"/>
+              </a:defRPr>
+            </a:lvl3pPr>
+            <a:lvl4pPr marL="864000" indent="-216000" algn="l" defTabSz="914400" rtl="0" eaLnBrk="1" latinLnBrk="0" hangingPunct="1">
+              <a:lnSpc>
+                <a:spcPct val="105000"/>
+              </a:lnSpc>
+              <a:spcBef>
+                <a:spcPts val="0"/>
+              </a:spcBef>
+              <a:buSzPct val="110000"/>
+              <a:buFont typeface="Arial" panose="020B0604020202020204" pitchFamily="34" charset="0"/>
+              <a:buChar char="-"/>
+              <a:defRPr sz="1800" kern="1200">
+                <a:solidFill>
+                  <a:schemeClr val="tx1"/>
+                </a:solidFill>
+                <a:latin typeface="+mn-lt"/>
+                <a:ea typeface="+mn-ea"/>
+                <a:cs typeface="+mn-cs"/>
+              </a:defRPr>
+            </a:lvl4pPr>
+            <a:lvl5pPr marL="1080000" indent="-216000" algn="l" defTabSz="914400" rtl="0" eaLnBrk="1" latinLnBrk="0" hangingPunct="1">
+              <a:lnSpc>
+                <a:spcPct val="105000"/>
+              </a:lnSpc>
+              <a:spcBef>
+                <a:spcPts val="0"/>
+              </a:spcBef>
+              <a:buSzPct val="65000"/>
+              <a:buFont typeface="Wingdings 2" panose="05020102010507070707" pitchFamily="18" charset="2"/>
+              <a:buChar char=""/>
+              <a:defRPr sz="1800" kern="1200">
+                <a:solidFill>
+                  <a:schemeClr val="tx1"/>
+                </a:solidFill>
+                <a:latin typeface="+mn-lt"/>
+                <a:ea typeface="+mn-ea"/>
+                <a:cs typeface="+mn-cs"/>
+              </a:defRPr>
+            </a:lvl5pPr>
+            <a:lvl6pPr marL="2514600" indent="-228600" algn="l" defTabSz="914400" rtl="0" eaLnBrk="1" latinLnBrk="0" hangingPunct="1">
+              <a:lnSpc>
+                <a:spcPct val="90000"/>
+              </a:lnSpc>
+              <a:spcBef>
+                <a:spcPts val="500"/>
+              </a:spcBef>
+              <a:buFont typeface="Arial" panose="020B0604020202020204" pitchFamily="34" charset="0"/>
+              <a:buChar char="•"/>
+              <a:defRPr sz="1800" kern="1200">
+                <a:solidFill>
+                  <a:schemeClr val="tx1"/>
+                </a:solidFill>
+                <a:latin typeface="+mn-lt"/>
+                <a:ea typeface="+mn-ea"/>
+                <a:cs typeface="+mn-cs"/>
+              </a:defRPr>
+            </a:lvl6pPr>
+            <a:lvl7pPr marL="2971800" indent="-228600" algn="l" defTabSz="914400" rtl="0" eaLnBrk="1" latinLnBrk="0" hangingPunct="1">
+              <a:lnSpc>
+                <a:spcPct val="90000"/>
+              </a:lnSpc>
+              <a:spcBef>
+                <a:spcPts val="500"/>
+              </a:spcBef>
+              <a:buFont typeface="Arial" panose="020B0604020202020204" pitchFamily="34" charset="0"/>
+              <a:buChar char="•"/>
+              <a:defRPr sz="1800" kern="1200">
+                <a:solidFill>
+                  <a:schemeClr val="tx1"/>
+                </a:solidFill>
+                <a:latin typeface="+mn-lt"/>
+                <a:ea typeface="+mn-ea"/>
+                <a:cs typeface="+mn-cs"/>
+              </a:defRPr>
+            </a:lvl7pPr>
+            <a:lvl8pPr marL="3429000" indent="-228600" algn="l" defTabSz="914400" rtl="0" eaLnBrk="1" latinLnBrk="0" hangingPunct="1">
+              <a:lnSpc>
+                <a:spcPct val="90000"/>
+              </a:lnSpc>
+              <a:spcBef>
+                <a:spcPts val="500"/>
+              </a:spcBef>
+              <a:buFont typeface="Arial" panose="020B0604020202020204" pitchFamily="34" charset="0"/>
+              <a:buChar char="•"/>
+              <a:defRPr sz="1800" kern="1200">
+                <a:solidFill>
+                  <a:schemeClr val="tx1"/>
+                </a:solidFill>
+                <a:latin typeface="+mn-lt"/>
+                <a:ea typeface="+mn-ea"/>
+                <a:cs typeface="+mn-cs"/>
+              </a:defRPr>
+            </a:lvl8pPr>
+            <a:lvl9pPr marL="3886200" indent="-228600" algn="l" defTabSz="914400" rtl="0" eaLnBrk="1" latinLnBrk="0" hangingPunct="1">
+              <a:lnSpc>
+                <a:spcPct val="90000"/>
+              </a:lnSpc>
+              <a:spcBef>
+                <a:spcPts val="500"/>
+              </a:spcBef>
+              <a:buFont typeface="Arial" panose="020B0604020202020204" pitchFamily="34" charset="0"/>
+              <a:buChar char="•"/>
+              <a:defRPr sz="1800" kern="1200">
+                <a:solidFill>
+                  <a:schemeClr val="tx1"/>
+                </a:solidFill>
+                <a:latin typeface="+mn-lt"/>
+                <a:ea typeface="+mn-ea"/>
+                <a:cs typeface="+mn-cs"/>
+              </a:defRPr>
+            </a:lvl9pPr>
+          </a:lstStyle>
+          <a:p>
+            <a:pPr marL="216000" lvl="1">
+              <a:spcBef>
+                <a:spcPts val="800"/>
+              </a:spcBef>
+              <a:buSzPct val="120000"/>
+              <a:buFont typeface="Arial" panose="020B0604020202020204" pitchFamily="34" charset="0"/>
+              <a:buChar char="•"/>
+            </a:pPr>
+            <a:r>
+              <a:rPr lang="de-AT" b="1" dirty="0"/>
+              <a:t>Neue Methoden ohne Datenbankzugriff oder komplizierter Logik (z.B. </a:t>
+            </a:r>
+            <a:r>
+              <a:rPr lang="de-AT" b="1"/>
+              <a:t>OCR) </a:t>
+            </a:r>
+            <a:r>
+              <a:rPr lang="de-AT" b="1" dirty="0"/>
+              <a:t>wurden mittels Unit-Tests abgebildet</a:t>
+            </a:r>
+          </a:p>
+          <a:p>
+            <a:endParaRPr lang="de-AT" b="1" dirty="0"/>
+          </a:p>
+          <a:p>
+            <a:endParaRPr lang="de-AT" b="1" dirty="0"/>
+          </a:p>
+          <a:p>
+            <a:pPr lvl="1"/>
+            <a:endParaRPr lang="de-AT" b="1" dirty="0"/>
+          </a:p>
+        </p:txBody>
+      </p:sp>
+    </p:spTree>
+    <p:extLst>
+      <p:ext uri="{BB962C8B-B14F-4D97-AF65-F5344CB8AC3E}">
+        <p14:creationId xmlns:p14="http://schemas.microsoft.com/office/powerpoint/2010/main" val="2810979960"/>
+      </p:ext>
+    </p:extLst>
+  </p:cSld>
+  <p:clrMapOvr>
+    <a:masterClrMapping/>
+  </p:clrMapOvr>
+</p:sld>
+</file>
+
+<file path=ppt/slides/slide5.xml><?xml version="1.0" encoding="utf-8"?>
+<p:sld xmlns:a="http://schemas.openxmlformats.org/drawingml/2006/main" xmlns:r="http://schemas.openxmlformats.org/officeDocument/2006/relationships" xmlns:p="http://schemas.openxmlformats.org/presentationml/2006/main">
+  <p:cSld>
+    <p:spTree>
+      <p:nvGrpSpPr>
+        <p:cNvPr id="1" name="">
+          <a:extLst>
+            <a:ext uri="{FF2B5EF4-FFF2-40B4-BE49-F238E27FC236}">
               <a16:creationId xmlns:a16="http://schemas.microsoft.com/office/drawing/2014/main" id="{D404F650-F06F-64C0-C658-9B63BF5E0929}"/>
             </a:ext>
           </a:extLst>
@@ -10379,7 +10826,7 @@
 </p:sld>
 </file>
 
-<file path=ppt/slides/slide5.xml><?xml version="1.0" encoding="utf-8"?>
+<file path=ppt/slides/slide6.xml><?xml version="1.0" encoding="utf-8"?>
 <p:sld xmlns:a="http://schemas.openxmlformats.org/drawingml/2006/main" xmlns:r="http://schemas.openxmlformats.org/officeDocument/2006/relationships" xmlns:p="http://schemas.openxmlformats.org/presentationml/2006/main">
   <p:cSld>
     <p:spTree>
@@ -10598,7 +11045,7 @@
 </p:sld>
 </file>
 
-<file path=ppt/slides/slide6.xml><?xml version="1.0" encoding="utf-8"?>
+<file path=ppt/slides/slide7.xml><?xml version="1.0" encoding="utf-8"?>
 <p:sld xmlns:a="http://schemas.openxmlformats.org/drawingml/2006/main" xmlns:r="http://schemas.openxmlformats.org/officeDocument/2006/relationships" xmlns:p="http://schemas.openxmlformats.org/presentationml/2006/main">
   <p:cSld>
     <p:spTree>
@@ -10848,7 +11295,7 @@
 </p:sld>
 </file>
 
-<file path=ppt/slides/slide7.xml><?xml version="1.0" encoding="utf-8"?>
+<file path=ppt/slides/slide8.xml><?xml version="1.0" encoding="utf-8"?>
 <p:sld xmlns:a="http://schemas.openxmlformats.org/drawingml/2006/main" xmlns:r="http://schemas.openxmlformats.org/officeDocument/2006/relationships" xmlns:p="http://schemas.openxmlformats.org/presentationml/2006/main">
   <p:cSld>
     <p:spTree>
@@ -10965,7 +11412,7 @@
 </p:sld>
 </file>
 
-<file path=ppt/slides/slide8.xml><?xml version="1.0" encoding="utf-8"?>
+<file path=ppt/slides/slide9.xml><?xml version="1.0" encoding="utf-8"?>
 <p:sld xmlns:a="http://schemas.openxmlformats.org/drawingml/2006/main" xmlns:r="http://schemas.openxmlformats.org/officeDocument/2006/relationships" xmlns:p="http://schemas.openxmlformats.org/presentationml/2006/main">
   <p:cSld>
     <p:spTree>

</xml_diff>